<commit_message>
004 First sample app
</commit_message>
<xml_diff>
--- a/Play take 2.pptx
+++ b/Play take 2.pptx
@@ -5,7 +5,7 @@
     <p:sldMasterId id="2147483648" r:id="rId1"/>
   </p:sldMasterIdLst>
   <p:notesMasterIdLst>
-    <p:notesMasterId r:id="rId17"/>
+    <p:notesMasterId r:id="rId18"/>
   </p:notesMasterIdLst>
   <p:sldIdLst>
     <p:sldId id="258" r:id="rId2"/>
@@ -22,7 +22,8 @@
     <p:sldId id="269" r:id="rId13"/>
     <p:sldId id="270" r:id="rId14"/>
     <p:sldId id="271" r:id="rId15"/>
-    <p:sldId id="267" r:id="rId16"/>
+    <p:sldId id="272" r:id="rId16"/>
+    <p:sldId id="267" r:id="rId17"/>
   </p:sldIdLst>
   <p:sldSz cx="9144000" cy="6858000" type="screen4x3"/>
   <p:notesSz cx="6858000" cy="9144000"/>
@@ -1649,31 +1650,7 @@
                 <a:ea typeface="+mn-ea"/>
                 <a:cs typeface="+mn-cs"/>
               </a:rPr>
-              <a:t>A basic route declaration is composed of </a:t>
-            </a:r>
-            <a:r>
-              <a:rPr lang="en-US" sz="1200" b="0" u="none" kern="1200" dirty="0" smtClean="0">
-                <a:solidFill>
-                  <a:schemeClr val="tx1"/>
-                </a:solidFill>
-                <a:effectLst/>
-                <a:latin typeface="+mn-lt"/>
-                <a:ea typeface="+mn-ea"/>
-                <a:cs typeface="+mn-cs"/>
-              </a:rPr>
-              <a:t>3 main </a:t>
-            </a:r>
-            <a:r>
-              <a:rPr lang="en-US" sz="1200" b="0" u="none" kern="1200" dirty="0" smtClean="0">
-                <a:solidFill>
-                  <a:schemeClr val="tx1"/>
-                </a:solidFill>
-                <a:effectLst/>
-                <a:latin typeface="+mn-lt"/>
-                <a:ea typeface="+mn-ea"/>
-                <a:cs typeface="+mn-cs"/>
-              </a:rPr>
-              <a:t>parts:</a:t>
+              <a:t>A basic route declaration is composed of 3 main parts:</a:t>
             </a:r>
           </a:p>
           <a:p>
@@ -2415,17 +2392,92 @@
           <a:p>
             <a:r>
               <a:rPr lang="en-US" dirty="0" smtClean="0"/>
-              <a:t>The contract for Controller is simply a class that implements </a:t>
-            </a:r>
-            <a:r>
-              <a:rPr lang="en-US" smtClean="0"/>
-              <a:t>the Controller abstract </a:t>
+              <a:t>The contract for Controller is simply a class that implements the Controller abstract base class</a:t>
             </a:r>
             <a:r>
               <a:rPr lang="en-US" dirty="0" smtClean="0"/>
-              <a:t>base class.</a:t>
-            </a:r>
-            <a:endParaRPr lang="pl-PL" dirty="0"/>
+              <a:t>.</a:t>
+            </a:r>
+          </a:p>
+          <a:p>
+            <a:endParaRPr lang="en-US" dirty="0" smtClean="0"/>
+          </a:p>
+          <a:p>
+            <a:pPr marL="0" marR="0" indent="0" algn="l" defTabSz="914400" rtl="0" eaLnBrk="1" fontAlgn="auto" latinLnBrk="0" hangingPunct="1">
+              <a:lnSpc>
+                <a:spcPct val="100000"/>
+              </a:lnSpc>
+              <a:spcBef>
+                <a:spcPts val="0"/>
+              </a:spcBef>
+              <a:spcAft>
+                <a:spcPts val="0"/>
+              </a:spcAft>
+              <a:buClrTx/>
+              <a:buSzTx/>
+              <a:buFontTx/>
+              <a:buNone/>
+              <a:tabLst/>
+              <a:defRPr/>
+            </a:pPr>
+            <a:r>
+              <a:rPr lang="en-US" dirty="0" smtClean="0"/>
+              <a:t>In Play!, Actions deal with HTTP Requests. Actions are implemented as static methods on the Controller.</a:t>
+            </a:r>
+          </a:p>
+          <a:p>
+            <a:r>
+              <a:rPr lang="en-US" dirty="0" smtClean="0"/>
+              <a:t>They operate on a Request object, a codified abstraction of the actual HTTP Request.</a:t>
+            </a:r>
+          </a:p>
+          <a:p>
+            <a:r>
+              <a:rPr lang="en-US" dirty="0" smtClean="0"/>
+              <a:t>They return a Result object, a codified abstraction of an HTTP Response.</a:t>
+            </a:r>
+          </a:p>
+          <a:p>
+            <a:r>
+              <a:rPr lang="en-US" dirty="0" smtClean="0"/>
+              <a:t>Result object provides an HTTP status and the content of a response.</a:t>
+            </a:r>
+          </a:p>
+          <a:p>
+            <a:r>
+              <a:rPr lang="en-US" dirty="0" smtClean="0"/>
+              <a:t>Controller class provides helpers that make defining these properties (HTTP status code and response content) extremely simple. </a:t>
+            </a:r>
+          </a:p>
+          <a:p>
+            <a:r>
+              <a:rPr lang="en-IE" b="1" dirty="0" smtClean="0"/>
+              <a:t>ok</a:t>
+            </a:r>
+            <a:r>
+              <a:rPr lang="en-IE" dirty="0" smtClean="0"/>
+              <a:t> and </a:t>
+            </a:r>
+            <a:r>
+              <a:rPr lang="en-IE" b="1" dirty="0" err="1" smtClean="0"/>
+              <a:t>badRequest</a:t>
+            </a:r>
+            <a:r>
+              <a:rPr lang="en-IE" dirty="0" smtClean="0"/>
+              <a:t> are examples of these</a:t>
+            </a:r>
+            <a:r>
+              <a:rPr lang="en-IE" baseline="0" dirty="0" smtClean="0"/>
+              <a:t> helper builders, Play! provides around 13 of them, but you can define your own (418, “</a:t>
+            </a:r>
+            <a:r>
+              <a:rPr lang="en-IE" baseline="0" dirty="0" err="1" smtClean="0"/>
+              <a:t>Im</a:t>
+            </a:r>
+            <a:r>
+              <a:rPr lang="en-IE" baseline="0" dirty="0" smtClean="0"/>
+              <a:t> a teapot”);</a:t>
+            </a:r>
           </a:p>
         </p:txBody>
       </p:sp>
@@ -8889,7 +8941,6 @@
               <a:rPr lang="en-IE" dirty="0" smtClean="0"/>
               <a:t>“Call the Customers controller list action when a GET request is made to the /customers route”</a:t>
             </a:r>
-            <a:endParaRPr lang="en-IE" dirty="0" smtClean="0"/>
           </a:p>
           <a:p>
             <a:r>
@@ -9690,25 +9741,6 @@
           </a:p>
         </p:txBody>
       </p:sp>
-      <p:sp>
-        <p:nvSpPr>
-          <p:cNvPr id="3" name="Symbol zastępczy zawartości 2"/>
-          <p:cNvSpPr>
-            <a:spLocks noGrp="1"/>
-          </p:cNvSpPr>
-          <p:nvPr>
-            <p:ph idx="1"/>
-          </p:nvPr>
-        </p:nvSpPr>
-        <p:spPr/>
-        <p:txBody>
-          <a:bodyPr/>
-          <a:lstStyle/>
-          <a:p>
-            <a:endParaRPr lang="pl-PL" dirty="0"/>
-          </a:p>
-        </p:txBody>
-      </p:sp>
       <p:pic>
         <p:nvPicPr>
           <p:cNvPr id="4" name="Picture 2"/>
@@ -9786,8 +9818,172 @@
         </p:blipFill>
         <p:spPr bwMode="auto">
           <a:xfrm>
-            <a:off x="1475656" y="1988840"/>
+            <a:off x="323528" y="1556792"/>
             <a:ext cx="3409950" cy="2343150"/>
+          </a:xfrm>
+          <a:prstGeom prst="rect">
+            <a:avLst/>
+          </a:prstGeom>
+          <a:noFill/>
+          <a:ln>
+            <a:noFill/>
+          </a:ln>
+          <a:extLst>
+            <a:ext uri="{909E8E84-426E-40DD-AFC4-6F175D3DCCD1}">
+              <a14:hiddenFill xmlns:a14="http://schemas.microsoft.com/office/drawing/2010/main">
+                <a:solidFill>
+                  <a:schemeClr val="accent1"/>
+                </a:solidFill>
+              </a14:hiddenFill>
+            </a:ext>
+            <a:ext uri="{91240B29-F687-4F45-9708-019B960494DF}">
+              <a14:hiddenLine xmlns:a14="http://schemas.microsoft.com/office/drawing/2010/main" w="9525">
+                <a:solidFill>
+                  <a:schemeClr val="tx1"/>
+                </a:solidFill>
+                <a:miter lim="800000"/>
+                <a:headEnd/>
+                <a:tailEnd/>
+              </a14:hiddenLine>
+            </a:ext>
+          </a:extLst>
+        </p:spPr>
+      </p:pic>
+      <p:pic>
+        <p:nvPicPr>
+          <p:cNvPr id="1026" name="Picture 2"/>
+          <p:cNvPicPr>
+            <a:picLocks noChangeAspect="1" noChangeArrowheads="1"/>
+          </p:cNvPicPr>
+          <p:nvPr/>
+        </p:nvPicPr>
+        <p:blipFill>
+          <a:blip r:embed="rId5">
+            <a:extLst>
+              <a:ext uri="{28A0092B-C50C-407E-A947-70E740481C1C}">
+                <a14:useLocalDpi xmlns:a14="http://schemas.microsoft.com/office/drawing/2010/main" val="0"/>
+              </a:ext>
+            </a:extLst>
+          </a:blip>
+          <a:srcRect/>
+          <a:stretch>
+            <a:fillRect/>
+          </a:stretch>
+        </p:blipFill>
+        <p:spPr bwMode="auto">
+          <a:xfrm>
+            <a:off x="4211960" y="1720255"/>
+            <a:ext cx="4128764" cy="1008112"/>
+          </a:xfrm>
+          <a:prstGeom prst="rect">
+            <a:avLst/>
+          </a:prstGeom>
+          <a:noFill/>
+          <a:ln>
+            <a:noFill/>
+          </a:ln>
+          <a:extLst>
+            <a:ext uri="{909E8E84-426E-40DD-AFC4-6F175D3DCCD1}">
+              <a14:hiddenFill xmlns:a14="http://schemas.microsoft.com/office/drawing/2010/main">
+                <a:solidFill>
+                  <a:schemeClr val="accent1"/>
+                </a:solidFill>
+              </a14:hiddenFill>
+            </a:ext>
+            <a:ext uri="{91240B29-F687-4F45-9708-019B960494DF}">
+              <a14:hiddenLine xmlns:a14="http://schemas.microsoft.com/office/drawing/2010/main" w="9525">
+                <a:solidFill>
+                  <a:schemeClr val="tx1"/>
+                </a:solidFill>
+                <a:miter lim="800000"/>
+                <a:headEnd/>
+                <a:tailEnd/>
+              </a14:hiddenLine>
+            </a:ext>
+          </a:extLst>
+        </p:spPr>
+      </p:pic>
+      <p:pic>
+        <p:nvPicPr>
+          <p:cNvPr id="1027" name="Picture 3"/>
+          <p:cNvPicPr>
+            <a:picLocks noGrp="1" noChangeAspect="1" noChangeArrowheads="1"/>
+          </p:cNvPicPr>
+          <p:nvPr>
+            <p:ph idx="1"/>
+          </p:nvPr>
+        </p:nvPicPr>
+        <p:blipFill>
+          <a:blip r:embed="rId6">
+            <a:extLst>
+              <a:ext uri="{28A0092B-C50C-407E-A947-70E740481C1C}">
+                <a14:useLocalDpi xmlns:a14="http://schemas.microsoft.com/office/drawing/2010/main" val="0"/>
+              </a:ext>
+            </a:extLst>
+          </a:blip>
+          <a:srcRect/>
+          <a:stretch>
+            <a:fillRect/>
+          </a:stretch>
+        </p:blipFill>
+        <p:spPr bwMode="auto">
+          <a:xfrm>
+            <a:off x="4499992" y="2757240"/>
+            <a:ext cx="3600400" cy="3022154"/>
+          </a:xfrm>
+          <a:prstGeom prst="rect">
+            <a:avLst/>
+          </a:prstGeom>
+          <a:noFill/>
+          <a:ln>
+            <a:noFill/>
+          </a:ln>
+          <a:extLst>
+            <a:ext uri="{909E8E84-426E-40DD-AFC4-6F175D3DCCD1}">
+              <a14:hiddenFill xmlns:a14="http://schemas.microsoft.com/office/drawing/2010/main">
+                <a:solidFill>
+                  <a:schemeClr val="accent1"/>
+                </a:solidFill>
+              </a14:hiddenFill>
+            </a:ext>
+            <a:ext uri="{91240B29-F687-4F45-9708-019B960494DF}">
+              <a14:hiddenLine xmlns:a14="http://schemas.microsoft.com/office/drawing/2010/main" w="9525">
+                <a:solidFill>
+                  <a:schemeClr val="tx1"/>
+                </a:solidFill>
+                <a:miter lim="800000"/>
+                <a:headEnd/>
+                <a:tailEnd/>
+              </a14:hiddenLine>
+            </a:ext>
+          </a:extLst>
+        </p:spPr>
+      </p:pic>
+      <p:pic>
+        <p:nvPicPr>
+          <p:cNvPr id="1028" name="Picture 4"/>
+          <p:cNvPicPr>
+            <a:picLocks noChangeAspect="1" noChangeArrowheads="1"/>
+          </p:cNvPicPr>
+          <p:nvPr/>
+        </p:nvPicPr>
+        <p:blipFill>
+          <a:blip r:embed="rId7">
+            <a:extLst>
+              <a:ext uri="{28A0092B-C50C-407E-A947-70E740481C1C}">
+                <a14:useLocalDpi xmlns:a14="http://schemas.microsoft.com/office/drawing/2010/main" val="0"/>
+              </a:ext>
+            </a:extLst>
+          </a:blip>
+          <a:srcRect/>
+          <a:stretch>
+            <a:fillRect/>
+          </a:stretch>
+        </p:blipFill>
+        <p:spPr bwMode="auto">
+          <a:xfrm>
+            <a:off x="583795" y="4365104"/>
+            <a:ext cx="3714750" cy="1314450"/>
           </a:xfrm>
           <a:prstGeom prst="rect">
             <a:avLst/>
@@ -9838,6 +10034,172 @@
 </file>
 
 <file path=ppt/slides/slide15.xml><?xml version="1.0" encoding="utf-8"?>
+<p:sld xmlns:a="http://schemas.openxmlformats.org/drawingml/2006/main" xmlns:r="http://schemas.openxmlformats.org/officeDocument/2006/relationships" xmlns:p="http://schemas.openxmlformats.org/presentationml/2006/main">
+  <p:cSld>
+    <p:spTree>
+      <p:nvGrpSpPr>
+        <p:cNvPr id="1" name=""/>
+        <p:cNvGrpSpPr/>
+        <p:nvPr/>
+      </p:nvGrpSpPr>
+      <p:grpSpPr>
+        <a:xfrm>
+          <a:off x="0" y="0"/>
+          <a:ext cx="0" cy="0"/>
+          <a:chOff x="0" y="0"/>
+          <a:chExt cx="0" cy="0"/>
+        </a:xfrm>
+      </p:grpSpPr>
+      <p:sp>
+        <p:nvSpPr>
+          <p:cNvPr id="2" name="Tytuł 1"/>
+          <p:cNvSpPr>
+            <a:spLocks noGrp="1"/>
+          </p:cNvSpPr>
+          <p:nvPr>
+            <p:ph type="title"/>
+          </p:nvPr>
+        </p:nvSpPr>
+        <p:spPr/>
+        <p:txBody>
+          <a:bodyPr/>
+          <a:lstStyle/>
+          <a:p>
+            <a:r>
+              <a:rPr lang="en-IE" dirty="0" smtClean="0"/>
+              <a:t>Views</a:t>
+            </a:r>
+            <a:endParaRPr lang="pl-PL" dirty="0"/>
+          </a:p>
+        </p:txBody>
+      </p:sp>
+      <p:sp>
+        <p:nvSpPr>
+          <p:cNvPr id="3" name="Symbol zastępczy zawartości 2"/>
+          <p:cNvSpPr>
+            <a:spLocks noGrp="1"/>
+          </p:cNvSpPr>
+          <p:nvPr>
+            <p:ph idx="1"/>
+          </p:nvPr>
+        </p:nvSpPr>
+        <p:spPr/>
+        <p:txBody>
+          <a:bodyPr/>
+          <a:lstStyle/>
+          <a:p>
+            <a:r>
+              <a:rPr lang="en-IE" dirty="0" smtClean="0"/>
+              <a:t>Views are Scala:</a:t>
+            </a:r>
+          </a:p>
+          <a:p>
+            <a:pPr lvl="1"/>
+            <a:r>
+              <a:rPr lang="en-IE" dirty="0"/>
+              <a:t>type safety</a:t>
+            </a:r>
+          </a:p>
+          <a:p>
+            <a:pPr lvl="1"/>
+            <a:r>
+              <a:rPr lang="en-IE" dirty="0"/>
+              <a:t>compile time syntax checking</a:t>
+            </a:r>
+          </a:p>
+          <a:p>
+            <a:r>
+              <a:rPr lang="en-IE" dirty="0" smtClean="0"/>
+              <a:t>Views have double extension </a:t>
+            </a:r>
+            <a:r>
+              <a:rPr lang="en-IE" smtClean="0"/>
+              <a:t>.scala.html</a:t>
+            </a:r>
+          </a:p>
+          <a:p>
+            <a:endParaRPr lang="en-IE" dirty="0"/>
+          </a:p>
+          <a:p>
+            <a:endParaRPr lang="en-IE" dirty="0" smtClean="0"/>
+          </a:p>
+          <a:p>
+            <a:endParaRPr lang="en-IE" dirty="0" smtClean="0"/>
+          </a:p>
+          <a:p>
+            <a:pPr lvl="1"/>
+            <a:endParaRPr lang="pl-PL" dirty="0"/>
+          </a:p>
+        </p:txBody>
+      </p:sp>
+      <p:pic>
+        <p:nvPicPr>
+          <p:cNvPr id="4" name="Picture 2"/>
+          <p:cNvPicPr>
+            <a:picLocks noChangeAspect="1" noChangeArrowheads="1"/>
+          </p:cNvPicPr>
+          <p:nvPr/>
+        </p:nvPicPr>
+        <p:blipFill>
+          <a:blip r:embed="rId2" cstate="print">
+            <a:extLst>
+              <a:ext uri="{28A0092B-C50C-407E-A947-70E740481C1C}">
+                <a14:useLocalDpi xmlns:a14="http://schemas.microsoft.com/office/drawing/2010/main" val="0"/>
+              </a:ext>
+            </a:extLst>
+          </a:blip>
+          <a:srcRect/>
+          <a:stretch>
+            <a:fillRect/>
+          </a:stretch>
+        </p:blipFill>
+        <p:spPr bwMode="auto">
+          <a:xfrm>
+            <a:off x="755576" y="532862"/>
+            <a:ext cx="2016224" cy="688262"/>
+          </a:xfrm>
+          <a:prstGeom prst="rect">
+            <a:avLst/>
+          </a:prstGeom>
+          <a:noFill/>
+          <a:ln>
+            <a:noFill/>
+          </a:ln>
+          <a:extLst>
+            <a:ext uri="{909E8E84-426E-40DD-AFC4-6F175D3DCCD1}">
+              <a14:hiddenFill xmlns:a14="http://schemas.microsoft.com/office/drawing/2010/main">
+                <a:solidFill>
+                  <a:schemeClr val="accent1"/>
+                </a:solidFill>
+              </a14:hiddenFill>
+            </a:ext>
+            <a:ext uri="{91240B29-F687-4F45-9708-019B960494DF}">
+              <a14:hiddenLine xmlns:a14="http://schemas.microsoft.com/office/drawing/2010/main" w="9525">
+                <a:solidFill>
+                  <a:schemeClr val="tx1"/>
+                </a:solidFill>
+                <a:miter lim="800000"/>
+                <a:headEnd/>
+                <a:tailEnd/>
+              </a14:hiddenLine>
+            </a:ext>
+          </a:extLst>
+        </p:spPr>
+      </p:pic>
+    </p:spTree>
+    <p:extLst>
+      <p:ext uri="{BB962C8B-B14F-4D97-AF65-F5344CB8AC3E}">
+        <p14:creationId xmlns:p14="http://schemas.microsoft.com/office/powerpoint/2010/main" val="1198489343"/>
+      </p:ext>
+    </p:extLst>
+  </p:cSld>
+  <p:clrMapOvr>
+    <a:masterClrMapping/>
+  </p:clrMapOvr>
+</p:sld>
+</file>
+
+<file path=ppt/slides/slide16.xml><?xml version="1.0" encoding="utf-8"?>
 <p:sld xmlns:a="http://schemas.openxmlformats.org/drawingml/2006/main" xmlns:r="http://schemas.openxmlformats.org/officeDocument/2006/relationships" xmlns:p="http://schemas.openxmlformats.org/presentationml/2006/main">
   <p:cSld>
     <p:spTree>

</xml_diff>